<commit_message>
Saturday Morning Work (Jacob)
</commit_message>
<xml_diff>
--- a/Presentation Stuff/CEE-345 Poster Template_36x48.pptx
+++ b/Presentation Stuff/CEE-345 Poster Template_36x48.pptx
@@ -242,7 +242,7 @@
             <a:fld id="{9D86B9FF-9AC8-4BED-B732-06D5AC893BF2}" type="datetimeFigureOut">
               <a:rPr lang="en-US" smtClean="0"/>
               <a:pPr/>
-              <a:t>5/1/2019</a:t>
+              <a:t>5/4</a:t>
             </a:fld>
             <a:endParaRPr lang="en-US"/>
           </a:p>
@@ -793,7 +793,7 @@
               <a:pPr>
                 <a:defRPr/>
               </a:pPr>
-              <a:t>5/1/2019</a:t>
+              <a:t>5/4</a:t>
             </a:fld>
             <a:endParaRPr lang="en-US"/>
           </a:p>
@@ -983,7 +983,7 @@
               <a:pPr>
                 <a:defRPr/>
               </a:pPr>
-              <a:t>5/1/2019</a:t>
+              <a:t>5/4</a:t>
             </a:fld>
             <a:endParaRPr lang="en-US"/>
           </a:p>
@@ -1183,7 +1183,7 @@
               <a:pPr>
                 <a:defRPr/>
               </a:pPr>
-              <a:t>5/1/2019</a:t>
+              <a:t>5/4</a:t>
             </a:fld>
             <a:endParaRPr lang="en-US"/>
           </a:p>
@@ -1373,7 +1373,7 @@
               <a:pPr>
                 <a:defRPr/>
               </a:pPr>
-              <a:t>5/1/2019</a:t>
+              <a:t>5/4</a:t>
             </a:fld>
             <a:endParaRPr lang="en-US"/>
           </a:p>
@@ -1640,7 +1640,7 @@
               <a:pPr>
                 <a:defRPr/>
               </a:pPr>
-              <a:t>5/1/2019</a:t>
+              <a:t>5/4</a:t>
             </a:fld>
             <a:endParaRPr lang="en-US"/>
           </a:p>
@@ -1947,7 +1947,7 @@
               <a:pPr>
                 <a:defRPr/>
               </a:pPr>
-              <a:t>5/1/2019</a:t>
+              <a:t>5/4</a:t>
             </a:fld>
             <a:endParaRPr lang="en-US"/>
           </a:p>
@@ -2388,7 +2388,7 @@
               <a:pPr>
                 <a:defRPr/>
               </a:pPr>
-              <a:t>5/1/2019</a:t>
+              <a:t>5/4</a:t>
             </a:fld>
             <a:endParaRPr lang="en-US"/>
           </a:p>
@@ -2527,7 +2527,7 @@
               <a:pPr>
                 <a:defRPr/>
               </a:pPr>
-              <a:t>5/1/2019</a:t>
+              <a:t>5/4</a:t>
             </a:fld>
             <a:endParaRPr lang="en-US"/>
           </a:p>
@@ -2644,7 +2644,7 @@
               <a:pPr>
                 <a:defRPr/>
               </a:pPr>
-              <a:t>5/1/2019</a:t>
+              <a:t>5/4</a:t>
             </a:fld>
             <a:endParaRPr lang="en-US"/>
           </a:p>
@@ -2941,7 +2941,7 @@
               <a:pPr>
                 <a:defRPr/>
               </a:pPr>
-              <a:t>5/1/2019</a:t>
+              <a:t>5/4</a:t>
             </a:fld>
             <a:endParaRPr lang="en-US"/>
           </a:p>
@@ -3218,7 +3218,7 @@
               <a:pPr>
                 <a:defRPr/>
               </a:pPr>
-              <a:t>5/1/2019</a:t>
+              <a:t>5/4</a:t>
             </a:fld>
             <a:endParaRPr lang="en-US"/>
           </a:p>
@@ -3474,7 +3474,7 @@
               <a:pPr>
                 <a:defRPr/>
               </a:pPr>
-              <a:t>5/1/2019</a:t>
+              <a:t>5/4</a:t>
             </a:fld>
             <a:endParaRPr lang="en-US"/>
           </a:p>
@@ -4155,7 +4155,7 @@
         <p:spPr bwMode="auto">
           <a:xfrm>
             <a:off x="532743" y="5115911"/>
-            <a:ext cx="12820650" cy="11310789"/>
+            <a:ext cx="12820650" cy="11803231"/>
           </a:xfrm>
           <a:prstGeom prst="rect">
             <a:avLst/>
@@ -4294,15 +4294,15 @@
             </a:pPr>
             <a:r>
               <a:rPr lang="en-US" sz="3200" b="1" dirty="0"/>
-              <a:t>The goal of this project was to create a countdown timer using the KL25Z development board, a 2*16 LCD, and a </a:t>
+              <a:t>The goal of this project was to create a countdown timer and stopwatch using the KL25Z development board, a 2x16 LCD, and a </a:t>
             </a:r>
             <a:r>
               <a:rPr lang="en-US" sz="3200" b="1" dirty="0" err="1"/>
-              <a:t>PmodKeypad</a:t>
+              <a:t>Digilent</a:t>
             </a:r>
             <a:r>
               <a:rPr lang="en-US" sz="3200" b="1" dirty="0"/>
-              <a:t>. The functionality will have a start, stop, pause, and resume.</a:t>
+              <a:t> Keypad. The functionality will have a start, stop, pause, and resume for both the timer and stopwatch.</a:t>
             </a:r>
             <a:endParaRPr lang="en-US" dirty="0"/>
           </a:p>
@@ -4430,7 +4430,7 @@
         </p:nvSpPr>
         <p:spPr bwMode="auto">
           <a:xfrm>
-            <a:off x="28599157" y="16803944"/>
+            <a:off x="28341145" y="13184660"/>
             <a:ext cx="12531402" cy="1028700"/>
           </a:xfrm>
           <a:prstGeom prst="rect">
@@ -4586,7 +4586,7 @@
         </p:nvSpPr>
         <p:spPr bwMode="auto">
           <a:xfrm>
-            <a:off x="14146923" y="13756071"/>
+            <a:off x="14146921" y="11532900"/>
             <a:ext cx="12448281" cy="1028700"/>
           </a:xfrm>
           <a:prstGeom prst="rect">
@@ -4625,8 +4625,8 @@
         </p:nvSpPr>
         <p:spPr bwMode="auto">
           <a:xfrm>
-            <a:off x="13836913" y="21925056"/>
-            <a:ext cx="13068300" cy="1028700"/>
+            <a:off x="532743" y="18720675"/>
+            <a:ext cx="12683358" cy="1028700"/>
           </a:xfrm>
           <a:prstGeom prst="rect">
             <a:avLst/>
@@ -4692,7 +4692,7 @@
           <p:nvPr>
             <p:extLst>
               <p:ext uri="{D42A27DB-BD31-4B8C-83A1-F6EECF244321}">
-                <p14:modId xmlns:p14="http://schemas.microsoft.com/office/powerpoint/2010/main" val="112590093"/>
+                <p14:modId xmlns:p14="http://schemas.microsoft.com/office/powerpoint/2010/main" val="3041051444"/>
               </p:ext>
             </p:extLst>
           </p:nvPr>
@@ -4810,7 +4810,7 @@
                     <a:p>
                       <a:r>
                         <a:rPr lang="en-US" sz="4000" dirty="0"/>
-                        <a:t>$10</a:t>
+                        <a:t>$6</a:t>
                       </a:r>
                     </a:p>
                   </a:txBody>
@@ -4843,9 +4843,12 @@
                     <a:p>
                       <a:r>
                         <a:rPr lang="en-US" sz="4000" dirty="0" err="1"/>
-                        <a:t>PmodKeypad</a:t>
+                        <a:t>Digilent</a:t>
                       </a:r>
-                      <a:endParaRPr lang="en-US" sz="4000" dirty="0"/>
+                      <a:r>
+                        <a:rPr lang="en-US" sz="4000" dirty="0"/>
+                        <a:t> Keypad</a:t>
+                      </a:r>
                     </a:p>
                   </a:txBody>
                   <a:tcPr/>
@@ -4903,7 +4906,7 @@
                     <a:p>
                       <a:r>
                         <a:rPr lang="en-US" sz="4000" dirty="0"/>
-                        <a:t>$15</a:t>
+                        <a:t>$31.11</a:t>
                       </a:r>
                     </a:p>
                   </a:txBody>
@@ -4992,7 +4995,7 @@
                     <a:p>
                       <a:r>
                         <a:rPr lang="en-US" sz="4000" dirty="0"/>
-                        <a:t>$36</a:t>
+                        <a:t>$48.11</a:t>
                       </a:r>
                     </a:p>
                   </a:txBody>
@@ -5017,7 +5020,7 @@
         <p:spPr>
           <a:xfrm>
             <a:off x="19566573" y="7026855"/>
-            <a:ext cx="6793279" cy="5509200"/>
+            <a:ext cx="6793279" cy="3046988"/>
           </a:xfrm>
           <a:prstGeom prst="rect">
             <a:avLst/>
@@ -5032,7 +5035,7 @@
           <a:p>
             <a:r>
               <a:rPr lang="en-US" sz="3200" b="1" dirty="0"/>
-              <a:t>This 16-button keypad is able to take a input from a user.  It has 8 pins, 4 of which were used as inputs and the other 4 for outputs in this project.  IT was then run using a 4x4 matrix.  Each row of the keypad has a pull up resistor, which helps to make sure every button push is read correctly.  While this keypad has 16 buttons, only 4 were used for this project.  </a:t>
+              <a:t>This 16-button keypad is able to take input from the user.  It has 8 pins, 4 of which were used as inputs and the other 4 for outputs in this project.  Rows are scanned for input using a 4x4 matrix.</a:t>
             </a:r>
           </a:p>
         </p:txBody>
@@ -5045,8 +5048,8 @@
         </p:nvSpPr>
         <p:spPr>
           <a:xfrm>
-            <a:off x="14241516" y="14895992"/>
-            <a:ext cx="12118335" cy="1569660"/>
+            <a:off x="14127632" y="12894062"/>
+            <a:ext cx="12118335" cy="2062103"/>
           </a:xfrm>
           <a:prstGeom prst="rect">
             <a:avLst/>
@@ -5061,7 +5064,7 @@
           <a:p>
             <a:r>
               <a:rPr lang="en-US" sz="3200" b="1" dirty="0"/>
-              <a:t>The LCD screen consists of 16 pins. There is power, contrast, data, read and write, and a clock enable. The screen take in a string or characters to print a\up to 16 characters per line.</a:t>
+              <a:t>The LCD screen consists of 16 pins. There is power, contrast, data, read and write, and a clock enable. The screen takes in 4 bits of coded binary to print characters a\up to 16 characters per line.</a:t>
             </a:r>
           </a:p>
         </p:txBody>
@@ -5114,7 +5117,7 @@
         <p:spPr>
           <a:xfrm>
             <a:off x="438806" y="16272646"/>
-            <a:ext cx="12725400" cy="3046988"/>
+            <a:ext cx="12725400" cy="2062103"/>
           </a:xfrm>
           <a:prstGeom prst="rect">
             <a:avLst/>
@@ -5129,23 +5132,23 @@
           <a:p>
             <a:r>
               <a:rPr lang="en-US" sz="3200" b="1" dirty="0"/>
-              <a:t>The brains of the operation is the KL25Z Freedom development board. This has a 32 bit processor that run at 48 </a:t>
+              <a:t>The brains of the operation is the KL25Z Freedom development board. The KL25Z has a 32-bit ARM Cortex M0+ processor that runs at 48 </a:t>
             </a:r>
             <a:r>
               <a:rPr lang="en-US" sz="3200" b="1" dirty="0" err="1"/>
-              <a:t>mHz.</a:t>
+              <a:t>MHz.</a:t>
             </a:r>
             <a:r>
               <a:rPr lang="en-US" sz="3200" b="1" dirty="0"/>
-              <a:t> Using this development board there is an implemented LCD and keypad. The LCD has a 2x16 character screen that displays characters. The </a:t>
+              <a:t> The GPIO on this board allows for control of peripheral devices, like the 2x16 LCD and </a:t>
             </a:r>
             <a:r>
               <a:rPr lang="en-US" sz="3200" b="1" dirty="0" err="1"/>
-              <a:t>PmodKeypad</a:t>
+              <a:t>Digilent</a:t>
             </a:r>
             <a:r>
               <a:rPr lang="en-US" sz="3200" b="1" dirty="0"/>
-              <a:t> is a 16 button keypad that will be used to give a specified input and output.</a:t>
+              <a:t> Keypad.</a:t>
             </a:r>
           </a:p>
         </p:txBody>
@@ -5172,8 +5175,8 @@
         </p:blipFill>
         <p:spPr>
           <a:xfrm>
-            <a:off x="13399283" y="7100325"/>
-            <a:ext cx="6121400" cy="5588000"/>
+            <a:off x="14146923" y="7034875"/>
+            <a:ext cx="4300930" cy="3926160"/>
           </a:xfrm>
           <a:prstGeom prst="rect">
             <a:avLst/>
@@ -5214,47 +5217,11 @@
                   <a:schemeClr val="bg1"/>
                 </a:solidFill>
               </a:rPr>
-              <a:t>Block Diagram and/or Flow Chart</a:t>
-            </a:r>
-          </a:p>
-        </p:txBody>
-      </p:sp>
-      <p:pic>
-        <p:nvPicPr>
-          <p:cNvPr id="7" name="Picture 6">
-            <a:extLst>
-              <a:ext uri="{FF2B5EF4-FFF2-40B4-BE49-F238E27FC236}">
-                <a16:creationId xmlns:a16="http://schemas.microsoft.com/office/drawing/2014/main" id="{6BE1C2D3-2CD1-4360-AABD-D26AB71A11C1}"/>
-              </a:ext>
-            </a:extLst>
-          </p:cNvPr>
-          <p:cNvPicPr>
-            <a:picLocks noChangeAspect="1"/>
-          </p:cNvPicPr>
-          <p:nvPr/>
-        </p:nvPicPr>
-        <p:blipFill>
-          <a:blip r:embed="rId5">
-            <a:extLst>
-              <a:ext uri="{28A0092B-C50C-407E-A947-70E740481C1C}">
-                <a14:useLocalDpi xmlns:a14="http://schemas.microsoft.com/office/drawing/2010/main" val="0"/>
-              </a:ext>
-            </a:extLst>
-          </a:blip>
-          <a:stretch>
-            <a:fillRect/>
-          </a:stretch>
-        </p:blipFill>
-        <p:spPr>
-          <a:xfrm>
-            <a:off x="28599156" y="7070162"/>
-            <a:ext cx="12448281" cy="9113371"/>
-          </a:xfrm>
-          <a:prstGeom prst="rect">
-            <a:avLst/>
-          </a:prstGeom>
-        </p:spPr>
-      </p:pic>
+              <a:t>Flow Chart</a:t>
+            </a:r>
+          </a:p>
+        </p:txBody>
+      </p:sp>
       <p:pic>
         <p:nvPicPr>
           <p:cNvPr id="8" name="Picture 7">
@@ -5270,15 +5237,15 @@
           <p:nvPr/>
         </p:nvPicPr>
         <p:blipFill>
-          <a:blip r:embed="rId6"/>
+          <a:blip r:embed="rId5"/>
           <a:stretch>
             <a:fillRect/>
           </a:stretch>
         </p:blipFill>
         <p:spPr>
           <a:xfrm>
-            <a:off x="14241516" y="16479272"/>
-            <a:ext cx="12353688" cy="5293514"/>
+            <a:off x="15817272" y="15194906"/>
+            <a:ext cx="8739054" cy="3744655"/>
           </a:xfrm>
           <a:prstGeom prst="rect">
             <a:avLst/>
@@ -5291,6 +5258,42 @@
             <a:extLst>
               <a:ext uri="{FF2B5EF4-FFF2-40B4-BE49-F238E27FC236}">
                 <a16:creationId xmlns:a16="http://schemas.microsoft.com/office/drawing/2014/main" id="{D2C4397E-2551-43B6-BF08-F68B46785D46}"/>
+              </a:ext>
+            </a:extLst>
+          </p:cNvPr>
+          <p:cNvPicPr>
+            <a:picLocks noChangeAspect="1"/>
+          </p:cNvPicPr>
+          <p:nvPr/>
+        </p:nvPicPr>
+        <p:blipFill>
+          <a:blip r:embed="rId6">
+            <a:extLst>
+              <a:ext uri="{28A0092B-C50C-407E-A947-70E740481C1C}">
+                <a14:useLocalDpi xmlns:a14="http://schemas.microsoft.com/office/drawing/2010/main" val="0"/>
+              </a:ext>
+            </a:extLst>
+          </a:blip>
+          <a:stretch>
+            <a:fillRect/>
+          </a:stretch>
+        </p:blipFill>
+        <p:spPr>
+          <a:xfrm>
+            <a:off x="1114561" y="20249238"/>
+            <a:ext cx="11290767" cy="6466648"/>
+          </a:xfrm>
+          <a:prstGeom prst="rect">
+            <a:avLst/>
+          </a:prstGeom>
+        </p:spPr>
+      </p:pic>
+      <p:pic>
+        <p:nvPicPr>
+          <p:cNvPr id="5" name="Picture 4" descr="A necklace with a piece of paper&#10;&#10;Description automatically generated">
+            <a:extLst>
+              <a:ext uri="{FF2B5EF4-FFF2-40B4-BE49-F238E27FC236}">
+                <a16:creationId xmlns:a16="http://schemas.microsoft.com/office/drawing/2014/main" id="{D97BFA2C-E0B4-4111-A5F8-42D7EB340813}"/>
               </a:ext>
             </a:extLst>
           </p:cNvPr>
@@ -5313,14 +5316,1444 @@
         </p:blipFill>
         <p:spPr>
           <a:xfrm>
-            <a:off x="14241516" y="23154661"/>
-            <a:ext cx="11018122" cy="6310494"/>
+            <a:off x="28370399" y="7440162"/>
+            <a:ext cx="12905796" cy="4996115"/>
           </a:xfrm>
           <a:prstGeom prst="rect">
             <a:avLst/>
           </a:prstGeom>
         </p:spPr>
       </p:pic>
+      <p:sp>
+        <p:nvSpPr>
+          <p:cNvPr id="28" name="Rectangle 18">
+            <a:extLst>
+              <a:ext uri="{FF2B5EF4-FFF2-40B4-BE49-F238E27FC236}">
+                <a16:creationId xmlns:a16="http://schemas.microsoft.com/office/drawing/2014/main" id="{7AB90E52-246C-44E6-88EB-759A262FDB37}"/>
+              </a:ext>
+            </a:extLst>
+          </p:cNvPr>
+          <p:cNvSpPr>
+            <a:spLocks noChangeArrowheads="1"/>
+          </p:cNvSpPr>
+          <p:nvPr/>
+        </p:nvSpPr>
+        <p:spPr bwMode="auto">
+          <a:xfrm>
+            <a:off x="14146921" y="19587324"/>
+            <a:ext cx="12448281" cy="1028700"/>
+          </a:xfrm>
+          <a:prstGeom prst="rect">
+            <a:avLst/>
+          </a:prstGeom>
+          <a:solidFill>
+            <a:schemeClr val="tx2"/>
+          </a:solidFill>
+          <a:ln>
+            <a:noFill/>
+          </a:ln>
+        </p:spPr>
+        <p:txBody>
+          <a:bodyPr wrap="none" lIns="137160" tIns="68580" rIns="137160" bIns="68580" anchor="ctr"/>
+          <a:lstStyle/>
+          <a:p>
+            <a:pPr algn="ctr" defTabSz="4703763"/>
+            <a:r>
+              <a:rPr lang="en-US" sz="5700" b="1" dirty="0">
+                <a:solidFill>
+                  <a:schemeClr val="bg1"/>
+                </a:solidFill>
+              </a:rPr>
+              <a:t>Final Design</a:t>
+            </a:r>
+          </a:p>
+        </p:txBody>
+      </p:sp>
+      <p:sp>
+        <p:nvSpPr>
+          <p:cNvPr id="10" name="Rectangle 9">
+            <a:extLst>
+              <a:ext uri="{FF2B5EF4-FFF2-40B4-BE49-F238E27FC236}">
+                <a16:creationId xmlns:a16="http://schemas.microsoft.com/office/drawing/2014/main" id="{56CD17D8-40B3-486B-986A-566F0777E605}"/>
+              </a:ext>
+            </a:extLst>
+          </p:cNvPr>
+          <p:cNvSpPr/>
+          <p:nvPr/>
+        </p:nvSpPr>
+        <p:spPr>
+          <a:xfrm>
+            <a:off x="29234201" y="14715552"/>
+            <a:ext cx="10745289" cy="13880723"/>
+          </a:xfrm>
+          <a:prstGeom prst="rect">
+            <a:avLst/>
+          </a:prstGeom>
+        </p:spPr>
+        <p:txBody>
+          <a:bodyPr wrap="square">
+            <a:spAutoFit/>
+          </a:bodyPr>
+          <a:lstStyle/>
+          <a:p>
+            <a:r>
+              <a:rPr lang="en-US" sz="2800" dirty="0">
+                <a:solidFill>
+                  <a:srgbClr val="8000FF"/>
+                </a:solidFill>
+                <a:latin typeface="Courier New" panose="02070309020205020404" pitchFamily="49" charset="0"/>
+              </a:rPr>
+              <a:t>void</a:t>
+            </a:r>
+            <a:r>
+              <a:rPr lang="en-US" sz="2800" dirty="0">
+                <a:solidFill>
+                  <a:srgbClr val="000000"/>
+                </a:solidFill>
+                <a:latin typeface="Courier New" panose="02070309020205020404" pitchFamily="49" charset="0"/>
+              </a:rPr>
+              <a:t> </a:t>
+            </a:r>
+            <a:r>
+              <a:rPr lang="en-US" sz="2800" dirty="0" err="1">
+                <a:solidFill>
+                  <a:srgbClr val="000000"/>
+                </a:solidFill>
+                <a:latin typeface="Courier New" panose="02070309020205020404" pitchFamily="49" charset="0"/>
+              </a:rPr>
+              <a:t>mode_select</a:t>
+            </a:r>
+            <a:r>
+              <a:rPr lang="en-US" sz="2800" b="1" dirty="0">
+                <a:solidFill>
+                  <a:srgbClr val="000080"/>
+                </a:solidFill>
+                <a:latin typeface="Courier New" panose="02070309020205020404" pitchFamily="49" charset="0"/>
+              </a:rPr>
+              <a:t>(</a:t>
+            </a:r>
+            <a:r>
+              <a:rPr lang="en-US" sz="2800" dirty="0">
+                <a:solidFill>
+                  <a:srgbClr val="8000FF"/>
+                </a:solidFill>
+                <a:latin typeface="Courier New" panose="02070309020205020404" pitchFamily="49" charset="0"/>
+              </a:rPr>
+              <a:t>void</a:t>
+            </a:r>
+            <a:r>
+              <a:rPr lang="en-US" sz="2800" b="1" dirty="0">
+                <a:solidFill>
+                  <a:srgbClr val="000080"/>
+                </a:solidFill>
+                <a:latin typeface="Courier New" panose="02070309020205020404" pitchFamily="49" charset="0"/>
+              </a:rPr>
+              <a:t>)</a:t>
+            </a:r>
+            <a:r>
+              <a:rPr lang="en-US" sz="2800" dirty="0">
+                <a:solidFill>
+                  <a:srgbClr val="000000"/>
+                </a:solidFill>
+                <a:latin typeface="Courier New" panose="02070309020205020404" pitchFamily="49" charset="0"/>
+              </a:rPr>
+              <a:t> </a:t>
+            </a:r>
+            <a:r>
+              <a:rPr lang="en-US" sz="2800" b="1" dirty="0">
+                <a:solidFill>
+                  <a:srgbClr val="000080"/>
+                </a:solidFill>
+                <a:latin typeface="Courier New" panose="02070309020205020404" pitchFamily="49" charset="0"/>
+              </a:rPr>
+              <a:t>{</a:t>
+            </a:r>
+            <a:r>
+              <a:rPr lang="en-US" sz="2800" dirty="0">
+                <a:solidFill>
+                  <a:srgbClr val="000000"/>
+                </a:solidFill>
+                <a:latin typeface="Courier New" panose="02070309020205020404" pitchFamily="49" charset="0"/>
+              </a:rPr>
+              <a:t> </a:t>
+            </a:r>
+          </a:p>
+          <a:p>
+            <a:pPr lvl="1"/>
+            <a:r>
+              <a:rPr lang="en-US" sz="2800" dirty="0">
+                <a:solidFill>
+                  <a:srgbClr val="008000"/>
+                </a:solidFill>
+                <a:latin typeface="Courier New" panose="02070309020205020404" pitchFamily="49" charset="0"/>
+              </a:rPr>
+              <a:t>//Variables for use </a:t>
+            </a:r>
+          </a:p>
+          <a:p>
+            <a:pPr lvl="1"/>
+            <a:r>
+              <a:rPr lang="en-US" sz="2800" dirty="0">
+                <a:solidFill>
+                  <a:srgbClr val="8000FF"/>
+                </a:solidFill>
+                <a:latin typeface="Courier New" panose="02070309020205020404" pitchFamily="49" charset="0"/>
+              </a:rPr>
+              <a:t>int</a:t>
+            </a:r>
+            <a:r>
+              <a:rPr lang="en-US" sz="2800" dirty="0">
+                <a:solidFill>
+                  <a:srgbClr val="000000"/>
+                </a:solidFill>
+                <a:latin typeface="Courier New" panose="02070309020205020404" pitchFamily="49" charset="0"/>
+              </a:rPr>
+              <a:t> </a:t>
+            </a:r>
+            <a:r>
+              <a:rPr lang="en-US" sz="2800" dirty="0" err="1">
+                <a:solidFill>
+                  <a:srgbClr val="000000"/>
+                </a:solidFill>
+                <a:latin typeface="Courier New" panose="02070309020205020404" pitchFamily="49" charset="0"/>
+              </a:rPr>
+              <a:t>not_done</a:t>
+            </a:r>
+            <a:r>
+              <a:rPr lang="en-US" sz="2800" dirty="0">
+                <a:solidFill>
+                  <a:srgbClr val="000000"/>
+                </a:solidFill>
+                <a:latin typeface="Courier New" panose="02070309020205020404" pitchFamily="49" charset="0"/>
+              </a:rPr>
+              <a:t> </a:t>
+            </a:r>
+            <a:r>
+              <a:rPr lang="en-US" sz="2800" b="1" dirty="0">
+                <a:solidFill>
+                  <a:srgbClr val="000080"/>
+                </a:solidFill>
+                <a:latin typeface="Courier New" panose="02070309020205020404" pitchFamily="49" charset="0"/>
+              </a:rPr>
+              <a:t>=</a:t>
+            </a:r>
+            <a:r>
+              <a:rPr lang="en-US" sz="2800" dirty="0">
+                <a:solidFill>
+                  <a:srgbClr val="000000"/>
+                </a:solidFill>
+                <a:latin typeface="Courier New" panose="02070309020205020404" pitchFamily="49" charset="0"/>
+              </a:rPr>
+              <a:t> </a:t>
+            </a:r>
+            <a:r>
+              <a:rPr lang="en-US" sz="2800" dirty="0">
+                <a:solidFill>
+                  <a:srgbClr val="FF8000"/>
+                </a:solidFill>
+                <a:latin typeface="Courier New" panose="02070309020205020404" pitchFamily="49" charset="0"/>
+              </a:rPr>
+              <a:t>1</a:t>
+            </a:r>
+            <a:r>
+              <a:rPr lang="en-US" sz="2800" b="1" dirty="0">
+                <a:solidFill>
+                  <a:srgbClr val="000080"/>
+                </a:solidFill>
+                <a:latin typeface="Courier New" panose="02070309020205020404" pitchFamily="49" charset="0"/>
+              </a:rPr>
+              <a:t>;</a:t>
+            </a:r>
+            <a:r>
+              <a:rPr lang="en-US" sz="2800" dirty="0">
+                <a:solidFill>
+                  <a:srgbClr val="000000"/>
+                </a:solidFill>
+                <a:latin typeface="Courier New" panose="02070309020205020404" pitchFamily="49" charset="0"/>
+              </a:rPr>
+              <a:t> </a:t>
+            </a:r>
+          </a:p>
+          <a:p>
+            <a:pPr lvl="1"/>
+            <a:r>
+              <a:rPr lang="en-US" sz="2800" dirty="0">
+                <a:solidFill>
+                  <a:srgbClr val="8000FF"/>
+                </a:solidFill>
+                <a:latin typeface="Courier New" panose="02070309020205020404" pitchFamily="49" charset="0"/>
+              </a:rPr>
+              <a:t>unsigned</a:t>
+            </a:r>
+            <a:r>
+              <a:rPr lang="en-US" sz="2800" dirty="0">
+                <a:solidFill>
+                  <a:srgbClr val="000000"/>
+                </a:solidFill>
+                <a:latin typeface="Courier New" panose="02070309020205020404" pitchFamily="49" charset="0"/>
+              </a:rPr>
+              <a:t> </a:t>
+            </a:r>
+            <a:r>
+              <a:rPr lang="en-US" sz="2800" dirty="0">
+                <a:solidFill>
+                  <a:srgbClr val="8000FF"/>
+                </a:solidFill>
+                <a:latin typeface="Courier New" panose="02070309020205020404" pitchFamily="49" charset="0"/>
+              </a:rPr>
+              <a:t>char</a:t>
+            </a:r>
+            <a:r>
+              <a:rPr lang="en-US" sz="2800" dirty="0">
+                <a:solidFill>
+                  <a:srgbClr val="000000"/>
+                </a:solidFill>
+                <a:latin typeface="Courier New" panose="02070309020205020404" pitchFamily="49" charset="0"/>
+              </a:rPr>
+              <a:t> key</a:t>
+            </a:r>
+            <a:r>
+              <a:rPr lang="en-US" sz="2800" b="1" dirty="0">
+                <a:solidFill>
+                  <a:srgbClr val="000080"/>
+                </a:solidFill>
+                <a:latin typeface="Courier New" panose="02070309020205020404" pitchFamily="49" charset="0"/>
+              </a:rPr>
+              <a:t>;</a:t>
+            </a:r>
+            <a:r>
+              <a:rPr lang="en-US" sz="2800" dirty="0">
+                <a:solidFill>
+                  <a:srgbClr val="000000"/>
+                </a:solidFill>
+                <a:latin typeface="Courier New" panose="02070309020205020404" pitchFamily="49" charset="0"/>
+              </a:rPr>
+              <a:t> </a:t>
+            </a:r>
+          </a:p>
+          <a:p>
+            <a:pPr lvl="1"/>
+            <a:endParaRPr lang="en-US" sz="2800" dirty="0">
+              <a:solidFill>
+                <a:srgbClr val="000000"/>
+              </a:solidFill>
+              <a:latin typeface="Courier New" panose="02070309020205020404" pitchFamily="49" charset="0"/>
+            </a:endParaRPr>
+          </a:p>
+          <a:p>
+            <a:pPr lvl="1"/>
+            <a:r>
+              <a:rPr lang="en-US" sz="2800" dirty="0">
+                <a:solidFill>
+                  <a:srgbClr val="008000"/>
+                </a:solidFill>
+                <a:latin typeface="Courier New" panose="02070309020205020404" pitchFamily="49" charset="0"/>
+              </a:rPr>
+              <a:t>//Print out instructions </a:t>
+            </a:r>
+          </a:p>
+          <a:p>
+            <a:pPr lvl="1"/>
+            <a:r>
+              <a:rPr lang="en-US" sz="2800" dirty="0" err="1">
+                <a:solidFill>
+                  <a:srgbClr val="000000"/>
+                </a:solidFill>
+                <a:latin typeface="Courier New" panose="02070309020205020404" pitchFamily="49" charset="0"/>
+              </a:rPr>
+              <a:t>Clear_LCD</a:t>
+            </a:r>
+            <a:r>
+              <a:rPr lang="en-US" sz="2800" b="1" dirty="0">
+                <a:solidFill>
+                  <a:srgbClr val="000080"/>
+                </a:solidFill>
+                <a:latin typeface="Courier New" panose="02070309020205020404" pitchFamily="49" charset="0"/>
+              </a:rPr>
+              <a:t>();</a:t>
+            </a:r>
+            <a:r>
+              <a:rPr lang="en-US" sz="2800" dirty="0">
+                <a:solidFill>
+                  <a:srgbClr val="000000"/>
+                </a:solidFill>
+                <a:latin typeface="Courier New" panose="02070309020205020404" pitchFamily="49" charset="0"/>
+              </a:rPr>
+              <a:t> </a:t>
+            </a:r>
+          </a:p>
+          <a:p>
+            <a:pPr lvl="1"/>
+            <a:r>
+              <a:rPr lang="en-US" sz="2800" dirty="0" err="1">
+                <a:solidFill>
+                  <a:srgbClr val="000000"/>
+                </a:solidFill>
+                <a:latin typeface="Courier New" panose="02070309020205020404" pitchFamily="49" charset="0"/>
+              </a:rPr>
+              <a:t>Print_LCD</a:t>
+            </a:r>
+            <a:r>
+              <a:rPr lang="en-US" sz="2800" b="1" dirty="0">
+                <a:solidFill>
+                  <a:srgbClr val="000080"/>
+                </a:solidFill>
+                <a:latin typeface="Courier New" panose="02070309020205020404" pitchFamily="49" charset="0"/>
+              </a:rPr>
+              <a:t>(</a:t>
+            </a:r>
+            <a:r>
+              <a:rPr lang="en-US" sz="2800" dirty="0">
+                <a:solidFill>
+                  <a:srgbClr val="808080"/>
+                </a:solidFill>
+                <a:latin typeface="Courier New" panose="02070309020205020404" pitchFamily="49" charset="0"/>
+              </a:rPr>
+              <a:t>"A - Timer"</a:t>
+            </a:r>
+            <a:r>
+              <a:rPr lang="en-US" sz="2800" b="1" dirty="0">
+                <a:solidFill>
+                  <a:srgbClr val="000080"/>
+                </a:solidFill>
+                <a:latin typeface="Courier New" panose="02070309020205020404" pitchFamily="49" charset="0"/>
+              </a:rPr>
+              <a:t>);</a:t>
+            </a:r>
+            <a:r>
+              <a:rPr lang="en-US" sz="2800" dirty="0">
+                <a:solidFill>
+                  <a:srgbClr val="000000"/>
+                </a:solidFill>
+                <a:latin typeface="Courier New" panose="02070309020205020404" pitchFamily="49" charset="0"/>
+              </a:rPr>
+              <a:t> </a:t>
+            </a:r>
+          </a:p>
+          <a:p>
+            <a:pPr lvl="1"/>
+            <a:r>
+              <a:rPr lang="en-US" sz="2800" dirty="0" err="1">
+                <a:solidFill>
+                  <a:srgbClr val="000000"/>
+                </a:solidFill>
+                <a:latin typeface="Courier New" panose="02070309020205020404" pitchFamily="49" charset="0"/>
+              </a:rPr>
+              <a:t>Set_Cursor</a:t>
+            </a:r>
+            <a:r>
+              <a:rPr lang="en-US" sz="2800" b="1" dirty="0">
+                <a:solidFill>
+                  <a:srgbClr val="000080"/>
+                </a:solidFill>
+                <a:latin typeface="Courier New" panose="02070309020205020404" pitchFamily="49" charset="0"/>
+              </a:rPr>
+              <a:t>(</a:t>
+            </a:r>
+            <a:r>
+              <a:rPr lang="en-US" sz="2800" dirty="0">
+                <a:solidFill>
+                  <a:srgbClr val="FF8000"/>
+                </a:solidFill>
+                <a:latin typeface="Courier New" panose="02070309020205020404" pitchFamily="49" charset="0"/>
+              </a:rPr>
+              <a:t>0</a:t>
+            </a:r>
+            <a:r>
+              <a:rPr lang="en-US" sz="2800" b="1" dirty="0">
+                <a:solidFill>
+                  <a:srgbClr val="000080"/>
+                </a:solidFill>
+                <a:latin typeface="Courier New" panose="02070309020205020404" pitchFamily="49" charset="0"/>
+              </a:rPr>
+              <a:t>,</a:t>
+            </a:r>
+            <a:r>
+              <a:rPr lang="en-US" sz="2800" dirty="0">
+                <a:solidFill>
+                  <a:srgbClr val="FF8000"/>
+                </a:solidFill>
+                <a:latin typeface="Courier New" panose="02070309020205020404" pitchFamily="49" charset="0"/>
+              </a:rPr>
+              <a:t>1</a:t>
+            </a:r>
+            <a:r>
+              <a:rPr lang="en-US" sz="2800" b="1" dirty="0">
+                <a:solidFill>
+                  <a:srgbClr val="000080"/>
+                </a:solidFill>
+                <a:latin typeface="Courier New" panose="02070309020205020404" pitchFamily="49" charset="0"/>
+              </a:rPr>
+              <a:t>);</a:t>
+            </a:r>
+            <a:r>
+              <a:rPr lang="en-US" sz="2800" dirty="0">
+                <a:solidFill>
+                  <a:srgbClr val="000000"/>
+                </a:solidFill>
+                <a:latin typeface="Courier New" panose="02070309020205020404" pitchFamily="49" charset="0"/>
+              </a:rPr>
+              <a:t> </a:t>
+            </a:r>
+          </a:p>
+          <a:p>
+            <a:pPr lvl="1"/>
+            <a:r>
+              <a:rPr lang="en-US" sz="2800" dirty="0" err="1">
+                <a:solidFill>
+                  <a:srgbClr val="000000"/>
+                </a:solidFill>
+                <a:latin typeface="Courier New" panose="02070309020205020404" pitchFamily="49" charset="0"/>
+              </a:rPr>
+              <a:t>Print_LCD</a:t>
+            </a:r>
+            <a:r>
+              <a:rPr lang="en-US" sz="2800" b="1" dirty="0">
+                <a:solidFill>
+                  <a:srgbClr val="000080"/>
+                </a:solidFill>
+                <a:latin typeface="Courier New" panose="02070309020205020404" pitchFamily="49" charset="0"/>
+              </a:rPr>
+              <a:t>(</a:t>
+            </a:r>
+            <a:r>
+              <a:rPr lang="en-US" sz="2800" dirty="0">
+                <a:solidFill>
+                  <a:srgbClr val="808080"/>
+                </a:solidFill>
+                <a:latin typeface="Courier New" panose="02070309020205020404" pitchFamily="49" charset="0"/>
+              </a:rPr>
+              <a:t>"B - Stopwatch"</a:t>
+            </a:r>
+            <a:r>
+              <a:rPr lang="en-US" sz="2800" b="1" dirty="0">
+                <a:solidFill>
+                  <a:srgbClr val="000080"/>
+                </a:solidFill>
+                <a:latin typeface="Courier New" panose="02070309020205020404" pitchFamily="49" charset="0"/>
+              </a:rPr>
+              <a:t>);</a:t>
+            </a:r>
+            <a:r>
+              <a:rPr lang="en-US" sz="2800" dirty="0">
+                <a:solidFill>
+                  <a:srgbClr val="000000"/>
+                </a:solidFill>
+                <a:latin typeface="Courier New" panose="02070309020205020404" pitchFamily="49" charset="0"/>
+              </a:rPr>
+              <a:t> </a:t>
+            </a:r>
+          </a:p>
+          <a:p>
+            <a:pPr lvl="1"/>
+            <a:endParaRPr lang="en-US" sz="2800" dirty="0">
+              <a:solidFill>
+                <a:srgbClr val="000000"/>
+              </a:solidFill>
+              <a:latin typeface="Courier New" panose="02070309020205020404" pitchFamily="49" charset="0"/>
+            </a:endParaRPr>
+          </a:p>
+          <a:p>
+            <a:pPr lvl="1"/>
+            <a:r>
+              <a:rPr lang="en-US" sz="2800" dirty="0">
+                <a:solidFill>
+                  <a:srgbClr val="008000"/>
+                </a:solidFill>
+                <a:latin typeface="Courier New" panose="02070309020205020404" pitchFamily="49" charset="0"/>
+              </a:rPr>
+              <a:t>//Pause for keypress </a:t>
+            </a:r>
+          </a:p>
+          <a:p>
+            <a:pPr lvl="1"/>
+            <a:r>
+              <a:rPr lang="en-US" sz="2800" b="1" dirty="0">
+                <a:solidFill>
+                  <a:srgbClr val="0000FF"/>
+                </a:solidFill>
+                <a:latin typeface="Courier New" panose="02070309020205020404" pitchFamily="49" charset="0"/>
+              </a:rPr>
+              <a:t>while</a:t>
+            </a:r>
+            <a:r>
+              <a:rPr lang="en-US" sz="2800" dirty="0">
+                <a:solidFill>
+                  <a:srgbClr val="000000"/>
+                </a:solidFill>
+                <a:latin typeface="Courier New" panose="02070309020205020404" pitchFamily="49" charset="0"/>
+              </a:rPr>
+              <a:t> </a:t>
+            </a:r>
+            <a:r>
+              <a:rPr lang="en-US" sz="2800" b="1" dirty="0">
+                <a:solidFill>
+                  <a:srgbClr val="000080"/>
+                </a:solidFill>
+                <a:latin typeface="Courier New" panose="02070309020205020404" pitchFamily="49" charset="0"/>
+              </a:rPr>
+              <a:t>(</a:t>
+            </a:r>
+            <a:r>
+              <a:rPr lang="en-US" sz="2800" dirty="0" err="1">
+                <a:solidFill>
+                  <a:srgbClr val="000000"/>
+                </a:solidFill>
+                <a:latin typeface="Courier New" panose="02070309020205020404" pitchFamily="49" charset="0"/>
+              </a:rPr>
+              <a:t>not_done</a:t>
+            </a:r>
+            <a:r>
+              <a:rPr lang="en-US" sz="2800" b="1" dirty="0">
+                <a:solidFill>
+                  <a:srgbClr val="000080"/>
+                </a:solidFill>
+                <a:latin typeface="Courier New" panose="02070309020205020404" pitchFamily="49" charset="0"/>
+              </a:rPr>
+              <a:t>)</a:t>
+            </a:r>
+            <a:r>
+              <a:rPr lang="en-US" sz="2800" dirty="0">
+                <a:solidFill>
+                  <a:srgbClr val="000000"/>
+                </a:solidFill>
+                <a:latin typeface="Courier New" panose="02070309020205020404" pitchFamily="49" charset="0"/>
+              </a:rPr>
+              <a:t> </a:t>
+            </a:r>
+            <a:r>
+              <a:rPr lang="en-US" sz="2800" b="1" dirty="0">
+                <a:solidFill>
+                  <a:srgbClr val="000080"/>
+                </a:solidFill>
+                <a:latin typeface="Courier New" panose="02070309020205020404" pitchFamily="49" charset="0"/>
+              </a:rPr>
+              <a:t>{</a:t>
+            </a:r>
+            <a:r>
+              <a:rPr lang="en-US" sz="2800" dirty="0">
+                <a:solidFill>
+                  <a:srgbClr val="000000"/>
+                </a:solidFill>
+                <a:latin typeface="Courier New" panose="02070309020205020404" pitchFamily="49" charset="0"/>
+              </a:rPr>
+              <a:t> </a:t>
+            </a:r>
+          </a:p>
+          <a:p>
+            <a:pPr lvl="1"/>
+            <a:r>
+              <a:rPr lang="en-US" sz="2800" dirty="0">
+                <a:solidFill>
+                  <a:srgbClr val="000000"/>
+                </a:solidFill>
+                <a:latin typeface="Courier New" panose="02070309020205020404" pitchFamily="49" charset="0"/>
+              </a:rPr>
+              <a:t>	key </a:t>
+            </a:r>
+            <a:r>
+              <a:rPr lang="en-US" sz="2800" b="1" dirty="0">
+                <a:solidFill>
+                  <a:srgbClr val="000080"/>
+                </a:solidFill>
+                <a:latin typeface="Courier New" panose="02070309020205020404" pitchFamily="49" charset="0"/>
+              </a:rPr>
+              <a:t>=</a:t>
+            </a:r>
+            <a:r>
+              <a:rPr lang="en-US" sz="2800" dirty="0">
+                <a:solidFill>
+                  <a:srgbClr val="000000"/>
+                </a:solidFill>
+                <a:latin typeface="Courier New" panose="02070309020205020404" pitchFamily="49" charset="0"/>
+              </a:rPr>
+              <a:t> </a:t>
+            </a:r>
+            <a:r>
+              <a:rPr lang="en-US" sz="2800" dirty="0" err="1">
+                <a:solidFill>
+                  <a:srgbClr val="000000"/>
+                </a:solidFill>
+                <a:latin typeface="Courier New" panose="02070309020205020404" pitchFamily="49" charset="0"/>
+              </a:rPr>
+              <a:t>keypad_getkey</a:t>
+            </a:r>
+            <a:r>
+              <a:rPr lang="en-US" sz="2800" b="1" dirty="0">
+                <a:solidFill>
+                  <a:srgbClr val="000080"/>
+                </a:solidFill>
+                <a:latin typeface="Courier New" panose="02070309020205020404" pitchFamily="49" charset="0"/>
+              </a:rPr>
+              <a:t>();</a:t>
+            </a:r>
+            <a:r>
+              <a:rPr lang="en-US" sz="2800" dirty="0">
+                <a:solidFill>
+                  <a:srgbClr val="000000"/>
+                </a:solidFill>
+                <a:latin typeface="Courier New" panose="02070309020205020404" pitchFamily="49" charset="0"/>
+              </a:rPr>
+              <a:t> </a:t>
+            </a:r>
+          </a:p>
+          <a:p>
+            <a:pPr lvl="1"/>
+            <a:r>
+              <a:rPr lang="en-US" sz="2800" b="1" dirty="0">
+                <a:solidFill>
+                  <a:srgbClr val="0000FF"/>
+                </a:solidFill>
+                <a:latin typeface="Courier New" panose="02070309020205020404" pitchFamily="49" charset="0"/>
+              </a:rPr>
+              <a:t>	if</a:t>
+            </a:r>
+            <a:r>
+              <a:rPr lang="en-US" sz="2800" dirty="0">
+                <a:solidFill>
+                  <a:srgbClr val="000000"/>
+                </a:solidFill>
+                <a:latin typeface="Courier New" panose="02070309020205020404" pitchFamily="49" charset="0"/>
+              </a:rPr>
+              <a:t> </a:t>
+            </a:r>
+            <a:r>
+              <a:rPr lang="en-US" sz="2800" b="1" dirty="0">
+                <a:solidFill>
+                  <a:srgbClr val="000080"/>
+                </a:solidFill>
+                <a:latin typeface="Courier New" panose="02070309020205020404" pitchFamily="49" charset="0"/>
+              </a:rPr>
+              <a:t>(</a:t>
+            </a:r>
+            <a:r>
+              <a:rPr lang="en-US" sz="2800" dirty="0">
+                <a:solidFill>
+                  <a:srgbClr val="000000"/>
+                </a:solidFill>
+                <a:latin typeface="Courier New" panose="02070309020205020404" pitchFamily="49" charset="0"/>
+              </a:rPr>
+              <a:t>key </a:t>
+            </a:r>
+            <a:r>
+              <a:rPr lang="en-US" sz="2800" b="1" dirty="0">
+                <a:solidFill>
+                  <a:srgbClr val="000080"/>
+                </a:solidFill>
+                <a:latin typeface="Courier New" panose="02070309020205020404" pitchFamily="49" charset="0"/>
+              </a:rPr>
+              <a:t>==</a:t>
+            </a:r>
+            <a:r>
+              <a:rPr lang="en-US" sz="2800" dirty="0">
+                <a:solidFill>
+                  <a:srgbClr val="000000"/>
+                </a:solidFill>
+                <a:latin typeface="Courier New" panose="02070309020205020404" pitchFamily="49" charset="0"/>
+              </a:rPr>
+              <a:t> </a:t>
+            </a:r>
+            <a:r>
+              <a:rPr lang="en-US" sz="2800" dirty="0">
+                <a:solidFill>
+                  <a:srgbClr val="808080"/>
+                </a:solidFill>
+                <a:latin typeface="Courier New" panose="02070309020205020404" pitchFamily="49" charset="0"/>
+              </a:rPr>
+              <a:t>'A'</a:t>
+            </a:r>
+            <a:r>
+              <a:rPr lang="en-US" sz="2800" dirty="0">
+                <a:solidFill>
+                  <a:srgbClr val="000000"/>
+                </a:solidFill>
+                <a:latin typeface="Courier New" panose="02070309020205020404" pitchFamily="49" charset="0"/>
+              </a:rPr>
+              <a:t> </a:t>
+            </a:r>
+            <a:r>
+              <a:rPr lang="en-US" sz="2800" b="1" dirty="0">
+                <a:solidFill>
+                  <a:srgbClr val="000080"/>
+                </a:solidFill>
+                <a:latin typeface="Courier New" panose="02070309020205020404" pitchFamily="49" charset="0"/>
+              </a:rPr>
+              <a:t>|</a:t>
+            </a:r>
+            <a:r>
+              <a:rPr lang="en-US" sz="2800" dirty="0">
+                <a:solidFill>
+                  <a:srgbClr val="000000"/>
+                </a:solidFill>
+                <a:latin typeface="Courier New" panose="02070309020205020404" pitchFamily="49" charset="0"/>
+              </a:rPr>
+              <a:t> key </a:t>
+            </a:r>
+            <a:r>
+              <a:rPr lang="en-US" sz="2800" b="1" dirty="0">
+                <a:solidFill>
+                  <a:srgbClr val="000080"/>
+                </a:solidFill>
+                <a:latin typeface="Courier New" panose="02070309020205020404" pitchFamily="49" charset="0"/>
+              </a:rPr>
+              <a:t>==</a:t>
+            </a:r>
+            <a:r>
+              <a:rPr lang="en-US" sz="2800" dirty="0">
+                <a:solidFill>
+                  <a:srgbClr val="000000"/>
+                </a:solidFill>
+                <a:latin typeface="Courier New" panose="02070309020205020404" pitchFamily="49" charset="0"/>
+              </a:rPr>
+              <a:t> </a:t>
+            </a:r>
+            <a:r>
+              <a:rPr lang="en-US" sz="2800" dirty="0">
+                <a:solidFill>
+                  <a:srgbClr val="808080"/>
+                </a:solidFill>
+                <a:latin typeface="Courier New" panose="02070309020205020404" pitchFamily="49" charset="0"/>
+              </a:rPr>
+              <a:t>'B'</a:t>
+            </a:r>
+            <a:r>
+              <a:rPr lang="en-US" sz="2800" b="1" dirty="0">
+                <a:solidFill>
+                  <a:srgbClr val="000080"/>
+                </a:solidFill>
+                <a:latin typeface="Courier New" panose="02070309020205020404" pitchFamily="49" charset="0"/>
+              </a:rPr>
+              <a:t>)</a:t>
+            </a:r>
+            <a:r>
+              <a:rPr lang="en-US" sz="2800" dirty="0">
+                <a:solidFill>
+                  <a:srgbClr val="000000"/>
+                </a:solidFill>
+                <a:latin typeface="Courier New" panose="02070309020205020404" pitchFamily="49" charset="0"/>
+              </a:rPr>
+              <a:t> </a:t>
+            </a:r>
+            <a:r>
+              <a:rPr lang="en-US" sz="2800" b="1" dirty="0">
+                <a:solidFill>
+                  <a:srgbClr val="000080"/>
+                </a:solidFill>
+                <a:latin typeface="Courier New" panose="02070309020205020404" pitchFamily="49" charset="0"/>
+              </a:rPr>
+              <a:t>{</a:t>
+            </a:r>
+            <a:r>
+              <a:rPr lang="en-US" sz="2800" dirty="0">
+                <a:solidFill>
+                  <a:srgbClr val="000000"/>
+                </a:solidFill>
+                <a:latin typeface="Courier New" panose="02070309020205020404" pitchFamily="49" charset="0"/>
+              </a:rPr>
+              <a:t> </a:t>
+            </a:r>
+          </a:p>
+          <a:p>
+            <a:pPr lvl="1"/>
+            <a:r>
+              <a:rPr lang="en-US" sz="2800" dirty="0">
+                <a:solidFill>
+                  <a:srgbClr val="000000"/>
+                </a:solidFill>
+                <a:latin typeface="Courier New" panose="02070309020205020404" pitchFamily="49" charset="0"/>
+              </a:rPr>
+              <a:t>		</a:t>
+            </a:r>
+            <a:r>
+              <a:rPr lang="en-US" sz="2800" dirty="0" err="1">
+                <a:solidFill>
+                  <a:srgbClr val="000000"/>
+                </a:solidFill>
+                <a:latin typeface="Courier New" panose="02070309020205020404" pitchFamily="49" charset="0"/>
+              </a:rPr>
+              <a:t>not_done</a:t>
+            </a:r>
+            <a:r>
+              <a:rPr lang="en-US" sz="2800" dirty="0">
+                <a:solidFill>
+                  <a:srgbClr val="000000"/>
+                </a:solidFill>
+                <a:latin typeface="Courier New" panose="02070309020205020404" pitchFamily="49" charset="0"/>
+              </a:rPr>
+              <a:t> </a:t>
+            </a:r>
+            <a:r>
+              <a:rPr lang="en-US" sz="2800" b="1" dirty="0">
+                <a:solidFill>
+                  <a:srgbClr val="000080"/>
+                </a:solidFill>
+                <a:latin typeface="Courier New" panose="02070309020205020404" pitchFamily="49" charset="0"/>
+              </a:rPr>
+              <a:t>=</a:t>
+            </a:r>
+            <a:r>
+              <a:rPr lang="en-US" sz="2800" dirty="0">
+                <a:solidFill>
+                  <a:srgbClr val="000000"/>
+                </a:solidFill>
+                <a:latin typeface="Courier New" panose="02070309020205020404" pitchFamily="49" charset="0"/>
+              </a:rPr>
+              <a:t> </a:t>
+            </a:r>
+            <a:r>
+              <a:rPr lang="en-US" sz="2800" dirty="0">
+                <a:solidFill>
+                  <a:srgbClr val="FF8000"/>
+                </a:solidFill>
+                <a:latin typeface="Courier New" panose="02070309020205020404" pitchFamily="49" charset="0"/>
+              </a:rPr>
+              <a:t>0</a:t>
+            </a:r>
+            <a:r>
+              <a:rPr lang="en-US" sz="2800" b="1" dirty="0">
+                <a:solidFill>
+                  <a:srgbClr val="000080"/>
+                </a:solidFill>
+                <a:latin typeface="Courier New" panose="02070309020205020404" pitchFamily="49" charset="0"/>
+              </a:rPr>
+              <a:t>;</a:t>
+            </a:r>
+            <a:r>
+              <a:rPr lang="en-US" sz="2800" dirty="0">
+                <a:solidFill>
+                  <a:srgbClr val="000000"/>
+                </a:solidFill>
+                <a:latin typeface="Courier New" panose="02070309020205020404" pitchFamily="49" charset="0"/>
+              </a:rPr>
+              <a:t> </a:t>
+            </a:r>
+          </a:p>
+          <a:p>
+            <a:pPr lvl="1"/>
+            <a:r>
+              <a:rPr lang="en-US" sz="2800" b="1" dirty="0">
+                <a:solidFill>
+                  <a:srgbClr val="000080"/>
+                </a:solidFill>
+                <a:latin typeface="Courier New" panose="02070309020205020404" pitchFamily="49" charset="0"/>
+              </a:rPr>
+              <a:t>	}</a:t>
+            </a:r>
+            <a:r>
+              <a:rPr lang="en-US" sz="2800" dirty="0">
+                <a:solidFill>
+                  <a:srgbClr val="000000"/>
+                </a:solidFill>
+                <a:latin typeface="Courier New" panose="02070309020205020404" pitchFamily="49" charset="0"/>
+              </a:rPr>
+              <a:t> </a:t>
+            </a:r>
+          </a:p>
+          <a:p>
+            <a:pPr lvl="1"/>
+            <a:r>
+              <a:rPr lang="en-US" sz="2800" b="1" dirty="0">
+                <a:solidFill>
+                  <a:srgbClr val="000080"/>
+                </a:solidFill>
+                <a:latin typeface="Courier New" panose="02070309020205020404" pitchFamily="49" charset="0"/>
+              </a:rPr>
+              <a:t>}</a:t>
+            </a:r>
+            <a:r>
+              <a:rPr lang="en-US" sz="2800" dirty="0">
+                <a:solidFill>
+                  <a:srgbClr val="000000"/>
+                </a:solidFill>
+                <a:latin typeface="Courier New" panose="02070309020205020404" pitchFamily="49" charset="0"/>
+              </a:rPr>
+              <a:t> </a:t>
+            </a:r>
+          </a:p>
+          <a:p>
+            <a:pPr lvl="1"/>
+            <a:endParaRPr lang="en-US" sz="2800" dirty="0">
+              <a:solidFill>
+                <a:srgbClr val="000000"/>
+              </a:solidFill>
+              <a:latin typeface="Courier New" panose="02070309020205020404" pitchFamily="49" charset="0"/>
+            </a:endParaRPr>
+          </a:p>
+          <a:p>
+            <a:pPr lvl="1"/>
+            <a:r>
+              <a:rPr lang="en-US" sz="2800" dirty="0">
+                <a:solidFill>
+                  <a:srgbClr val="008000"/>
+                </a:solidFill>
+                <a:latin typeface="Courier New" panose="02070309020205020404" pitchFamily="49" charset="0"/>
+              </a:rPr>
+              <a:t>//Based on keypress, take action </a:t>
+            </a:r>
+          </a:p>
+          <a:p>
+            <a:pPr lvl="1"/>
+            <a:r>
+              <a:rPr lang="en-US" sz="2800" b="1" dirty="0">
+                <a:solidFill>
+                  <a:srgbClr val="0000FF"/>
+                </a:solidFill>
+                <a:latin typeface="Courier New" panose="02070309020205020404" pitchFamily="49" charset="0"/>
+              </a:rPr>
+              <a:t>switch</a:t>
+            </a:r>
+            <a:r>
+              <a:rPr lang="en-US" sz="2800" dirty="0">
+                <a:solidFill>
+                  <a:srgbClr val="000000"/>
+                </a:solidFill>
+                <a:latin typeface="Courier New" panose="02070309020205020404" pitchFamily="49" charset="0"/>
+              </a:rPr>
+              <a:t> </a:t>
+            </a:r>
+            <a:r>
+              <a:rPr lang="en-US" sz="2800" b="1" dirty="0">
+                <a:solidFill>
+                  <a:srgbClr val="000080"/>
+                </a:solidFill>
+                <a:latin typeface="Courier New" panose="02070309020205020404" pitchFamily="49" charset="0"/>
+              </a:rPr>
+              <a:t>(</a:t>
+            </a:r>
+            <a:r>
+              <a:rPr lang="en-US" sz="2800" dirty="0">
+                <a:solidFill>
+                  <a:srgbClr val="000000"/>
+                </a:solidFill>
+                <a:latin typeface="Courier New" panose="02070309020205020404" pitchFamily="49" charset="0"/>
+              </a:rPr>
+              <a:t>key</a:t>
+            </a:r>
+            <a:r>
+              <a:rPr lang="en-US" sz="2800" b="1" dirty="0">
+                <a:solidFill>
+                  <a:srgbClr val="000080"/>
+                </a:solidFill>
+                <a:latin typeface="Courier New" panose="02070309020205020404" pitchFamily="49" charset="0"/>
+              </a:rPr>
+              <a:t>)</a:t>
+            </a:r>
+            <a:r>
+              <a:rPr lang="en-US" sz="2800" dirty="0">
+                <a:solidFill>
+                  <a:srgbClr val="000000"/>
+                </a:solidFill>
+                <a:latin typeface="Courier New" panose="02070309020205020404" pitchFamily="49" charset="0"/>
+              </a:rPr>
+              <a:t> </a:t>
+            </a:r>
+            <a:r>
+              <a:rPr lang="en-US" sz="2800" b="1" dirty="0">
+                <a:solidFill>
+                  <a:srgbClr val="000080"/>
+                </a:solidFill>
+                <a:latin typeface="Courier New" panose="02070309020205020404" pitchFamily="49" charset="0"/>
+              </a:rPr>
+              <a:t>{</a:t>
+            </a:r>
+            <a:r>
+              <a:rPr lang="en-US" sz="2800" dirty="0">
+                <a:solidFill>
+                  <a:srgbClr val="000000"/>
+                </a:solidFill>
+                <a:latin typeface="Courier New" panose="02070309020205020404" pitchFamily="49" charset="0"/>
+              </a:rPr>
+              <a:t> </a:t>
+            </a:r>
+          </a:p>
+          <a:p>
+            <a:pPr lvl="1"/>
+            <a:r>
+              <a:rPr lang="en-US" sz="2800" b="1" dirty="0">
+                <a:solidFill>
+                  <a:srgbClr val="0000FF"/>
+                </a:solidFill>
+                <a:latin typeface="Courier New" panose="02070309020205020404" pitchFamily="49" charset="0"/>
+              </a:rPr>
+              <a:t>	case</a:t>
+            </a:r>
+            <a:r>
+              <a:rPr lang="en-US" sz="2800" dirty="0">
+                <a:solidFill>
+                  <a:srgbClr val="000000"/>
+                </a:solidFill>
+                <a:latin typeface="Courier New" panose="02070309020205020404" pitchFamily="49" charset="0"/>
+              </a:rPr>
+              <a:t> </a:t>
+            </a:r>
+            <a:r>
+              <a:rPr lang="en-US" sz="2800" dirty="0">
+                <a:solidFill>
+                  <a:srgbClr val="808080"/>
+                </a:solidFill>
+                <a:latin typeface="Courier New" panose="02070309020205020404" pitchFamily="49" charset="0"/>
+              </a:rPr>
+              <a:t>'A’</a:t>
+            </a:r>
+            <a:r>
+              <a:rPr lang="en-US" sz="2800" dirty="0">
+                <a:solidFill>
+                  <a:srgbClr val="000000"/>
+                </a:solidFill>
+                <a:latin typeface="Courier New" panose="02070309020205020404" pitchFamily="49" charset="0"/>
+              </a:rPr>
+              <a:t> </a:t>
+            </a:r>
+            <a:r>
+              <a:rPr lang="en-US" sz="2800" b="1" dirty="0">
+                <a:solidFill>
+                  <a:srgbClr val="000080"/>
+                </a:solidFill>
+                <a:latin typeface="Courier New" panose="02070309020205020404" pitchFamily="49" charset="0"/>
+              </a:rPr>
+              <a:t>:</a:t>
+            </a:r>
+            <a:r>
+              <a:rPr lang="en-US" sz="2800" dirty="0">
+                <a:solidFill>
+                  <a:srgbClr val="000000"/>
+                </a:solidFill>
+                <a:latin typeface="Courier New" panose="02070309020205020404" pitchFamily="49" charset="0"/>
+              </a:rPr>
+              <a:t> </a:t>
+            </a:r>
+          </a:p>
+          <a:p>
+            <a:pPr lvl="1"/>
+            <a:r>
+              <a:rPr lang="en-US" sz="2800" dirty="0">
+                <a:solidFill>
+                  <a:srgbClr val="000000"/>
+                </a:solidFill>
+                <a:latin typeface="Courier New" panose="02070309020205020404" pitchFamily="49" charset="0"/>
+              </a:rPr>
+              <a:t>		</a:t>
+            </a:r>
+            <a:r>
+              <a:rPr lang="en-US" sz="2800" dirty="0" err="1">
+                <a:solidFill>
+                  <a:srgbClr val="000000"/>
+                </a:solidFill>
+                <a:latin typeface="Courier New" panose="02070309020205020404" pitchFamily="49" charset="0"/>
+              </a:rPr>
+              <a:t>set_timer</a:t>
+            </a:r>
+            <a:r>
+              <a:rPr lang="en-US" sz="2800" b="1" dirty="0">
+                <a:solidFill>
+                  <a:srgbClr val="000080"/>
+                </a:solidFill>
+                <a:latin typeface="Courier New" panose="02070309020205020404" pitchFamily="49" charset="0"/>
+              </a:rPr>
+              <a:t>();</a:t>
+            </a:r>
+            <a:r>
+              <a:rPr lang="en-US" sz="2800" dirty="0">
+                <a:solidFill>
+                  <a:srgbClr val="000000"/>
+                </a:solidFill>
+                <a:latin typeface="Courier New" panose="02070309020205020404" pitchFamily="49" charset="0"/>
+              </a:rPr>
+              <a:t> </a:t>
+            </a:r>
+          </a:p>
+          <a:p>
+            <a:pPr lvl="1"/>
+            <a:r>
+              <a:rPr lang="en-US" sz="2800" dirty="0">
+                <a:solidFill>
+                  <a:srgbClr val="000000"/>
+                </a:solidFill>
+                <a:latin typeface="Courier New" panose="02070309020205020404" pitchFamily="49" charset="0"/>
+              </a:rPr>
+              <a:t>		</a:t>
+            </a:r>
+            <a:r>
+              <a:rPr lang="en-US" sz="2800" dirty="0" err="1">
+                <a:solidFill>
+                  <a:srgbClr val="000000"/>
+                </a:solidFill>
+                <a:latin typeface="Courier New" panose="02070309020205020404" pitchFamily="49" charset="0"/>
+              </a:rPr>
+              <a:t>timer_countdown</a:t>
+            </a:r>
+            <a:r>
+              <a:rPr lang="en-US" sz="2800" b="1" dirty="0">
+                <a:solidFill>
+                  <a:srgbClr val="000080"/>
+                </a:solidFill>
+                <a:latin typeface="Courier New" panose="02070309020205020404" pitchFamily="49" charset="0"/>
+              </a:rPr>
+              <a:t>();</a:t>
+            </a:r>
+            <a:r>
+              <a:rPr lang="en-US" sz="2800" dirty="0">
+                <a:solidFill>
+                  <a:srgbClr val="000000"/>
+                </a:solidFill>
+                <a:latin typeface="Courier New" panose="02070309020205020404" pitchFamily="49" charset="0"/>
+              </a:rPr>
+              <a:t> </a:t>
+            </a:r>
+          </a:p>
+          <a:p>
+            <a:pPr lvl="1"/>
+            <a:r>
+              <a:rPr lang="en-US" sz="2800" b="1" dirty="0">
+                <a:solidFill>
+                  <a:srgbClr val="0000FF"/>
+                </a:solidFill>
+                <a:latin typeface="Courier New" panose="02070309020205020404" pitchFamily="49" charset="0"/>
+              </a:rPr>
+              <a:t>		break</a:t>
+            </a:r>
+            <a:r>
+              <a:rPr lang="en-US" sz="2800" b="1" dirty="0">
+                <a:solidFill>
+                  <a:srgbClr val="000080"/>
+                </a:solidFill>
+                <a:latin typeface="Courier New" panose="02070309020205020404" pitchFamily="49" charset="0"/>
+              </a:rPr>
+              <a:t>;</a:t>
+            </a:r>
+            <a:r>
+              <a:rPr lang="en-US" sz="2800" dirty="0">
+                <a:solidFill>
+                  <a:srgbClr val="000000"/>
+                </a:solidFill>
+                <a:latin typeface="Courier New" panose="02070309020205020404" pitchFamily="49" charset="0"/>
+              </a:rPr>
+              <a:t> </a:t>
+            </a:r>
+          </a:p>
+          <a:p>
+            <a:pPr lvl="1"/>
+            <a:r>
+              <a:rPr lang="en-US" sz="2800" b="1" dirty="0">
+                <a:solidFill>
+                  <a:srgbClr val="0000FF"/>
+                </a:solidFill>
+                <a:latin typeface="Courier New" panose="02070309020205020404" pitchFamily="49" charset="0"/>
+              </a:rPr>
+              <a:t>	case</a:t>
+            </a:r>
+            <a:r>
+              <a:rPr lang="en-US" sz="2800" dirty="0">
+                <a:solidFill>
+                  <a:srgbClr val="000000"/>
+                </a:solidFill>
+                <a:latin typeface="Courier New" panose="02070309020205020404" pitchFamily="49" charset="0"/>
+              </a:rPr>
+              <a:t> </a:t>
+            </a:r>
+            <a:r>
+              <a:rPr lang="en-US" sz="2800" dirty="0">
+                <a:solidFill>
+                  <a:srgbClr val="808080"/>
+                </a:solidFill>
+                <a:latin typeface="Courier New" panose="02070309020205020404" pitchFamily="49" charset="0"/>
+              </a:rPr>
+              <a:t>'B’</a:t>
+            </a:r>
+            <a:r>
+              <a:rPr lang="en-US" sz="2800" dirty="0">
+                <a:solidFill>
+                  <a:srgbClr val="000000"/>
+                </a:solidFill>
+                <a:latin typeface="Courier New" panose="02070309020205020404" pitchFamily="49" charset="0"/>
+              </a:rPr>
+              <a:t> </a:t>
+            </a:r>
+            <a:r>
+              <a:rPr lang="en-US" sz="2800" b="1" dirty="0">
+                <a:solidFill>
+                  <a:srgbClr val="000080"/>
+                </a:solidFill>
+                <a:latin typeface="Courier New" panose="02070309020205020404" pitchFamily="49" charset="0"/>
+              </a:rPr>
+              <a:t>:</a:t>
+            </a:r>
+            <a:r>
+              <a:rPr lang="en-US" sz="2800" dirty="0">
+                <a:solidFill>
+                  <a:srgbClr val="000000"/>
+                </a:solidFill>
+                <a:latin typeface="Courier New" panose="02070309020205020404" pitchFamily="49" charset="0"/>
+              </a:rPr>
+              <a:t> </a:t>
+            </a:r>
+          </a:p>
+          <a:p>
+            <a:pPr lvl="1"/>
+            <a:r>
+              <a:rPr lang="en-US" sz="2800" dirty="0">
+                <a:solidFill>
+                  <a:srgbClr val="000000"/>
+                </a:solidFill>
+                <a:latin typeface="Courier New" panose="02070309020205020404" pitchFamily="49" charset="0"/>
+              </a:rPr>
+              <a:t>		stopwatch</a:t>
+            </a:r>
+            <a:r>
+              <a:rPr lang="en-US" sz="2800" b="1" dirty="0">
+                <a:solidFill>
+                  <a:srgbClr val="000080"/>
+                </a:solidFill>
+                <a:latin typeface="Courier New" panose="02070309020205020404" pitchFamily="49" charset="0"/>
+              </a:rPr>
+              <a:t>();</a:t>
+            </a:r>
+            <a:r>
+              <a:rPr lang="en-US" sz="2800" dirty="0">
+                <a:solidFill>
+                  <a:srgbClr val="000000"/>
+                </a:solidFill>
+                <a:latin typeface="Courier New" panose="02070309020205020404" pitchFamily="49" charset="0"/>
+              </a:rPr>
+              <a:t> </a:t>
+            </a:r>
+          </a:p>
+          <a:p>
+            <a:pPr lvl="1"/>
+            <a:r>
+              <a:rPr lang="en-US" sz="2800" b="1" dirty="0">
+                <a:solidFill>
+                  <a:srgbClr val="0000FF"/>
+                </a:solidFill>
+                <a:latin typeface="Courier New" panose="02070309020205020404" pitchFamily="49" charset="0"/>
+              </a:rPr>
+              <a:t>		break</a:t>
+            </a:r>
+            <a:r>
+              <a:rPr lang="en-US" sz="2800" b="1" dirty="0">
+                <a:solidFill>
+                  <a:srgbClr val="000080"/>
+                </a:solidFill>
+                <a:latin typeface="Courier New" panose="02070309020205020404" pitchFamily="49" charset="0"/>
+              </a:rPr>
+              <a:t>;</a:t>
+            </a:r>
+            <a:r>
+              <a:rPr lang="en-US" sz="2800" dirty="0">
+                <a:solidFill>
+                  <a:srgbClr val="000000"/>
+                </a:solidFill>
+                <a:latin typeface="Courier New" panose="02070309020205020404" pitchFamily="49" charset="0"/>
+              </a:rPr>
+              <a:t> </a:t>
+            </a:r>
+          </a:p>
+          <a:p>
+            <a:pPr lvl="1"/>
+            <a:r>
+              <a:rPr lang="en-US" sz="2800" b="1" dirty="0">
+                <a:solidFill>
+                  <a:srgbClr val="0000FF"/>
+                </a:solidFill>
+                <a:latin typeface="Courier New" panose="02070309020205020404" pitchFamily="49" charset="0"/>
+              </a:rPr>
+              <a:t>	default</a:t>
+            </a:r>
+            <a:r>
+              <a:rPr lang="en-US" sz="2800" dirty="0">
+                <a:solidFill>
+                  <a:srgbClr val="000000"/>
+                </a:solidFill>
+                <a:latin typeface="Courier New" panose="02070309020205020404" pitchFamily="49" charset="0"/>
+              </a:rPr>
+              <a:t> </a:t>
+            </a:r>
+            <a:r>
+              <a:rPr lang="en-US" sz="2800" b="1" dirty="0">
+                <a:solidFill>
+                  <a:srgbClr val="000080"/>
+                </a:solidFill>
+                <a:latin typeface="Courier New" panose="02070309020205020404" pitchFamily="49" charset="0"/>
+              </a:rPr>
+              <a:t>:</a:t>
+            </a:r>
+            <a:r>
+              <a:rPr lang="en-US" sz="2800" dirty="0">
+                <a:solidFill>
+                  <a:srgbClr val="000000"/>
+                </a:solidFill>
+                <a:latin typeface="Courier New" panose="02070309020205020404" pitchFamily="49" charset="0"/>
+              </a:rPr>
+              <a:t> </a:t>
+            </a:r>
+          </a:p>
+          <a:p>
+            <a:pPr lvl="1"/>
+            <a:r>
+              <a:rPr lang="en-US" sz="2800" b="1" dirty="0">
+                <a:solidFill>
+                  <a:srgbClr val="0000FF"/>
+                </a:solidFill>
+                <a:latin typeface="Courier New" panose="02070309020205020404" pitchFamily="49" charset="0"/>
+              </a:rPr>
+              <a:t>		break</a:t>
+            </a:r>
+            <a:r>
+              <a:rPr lang="en-US" sz="2800" b="1" dirty="0">
+                <a:solidFill>
+                  <a:srgbClr val="000080"/>
+                </a:solidFill>
+                <a:latin typeface="Courier New" panose="02070309020205020404" pitchFamily="49" charset="0"/>
+              </a:rPr>
+              <a:t>;</a:t>
+            </a:r>
+            <a:r>
+              <a:rPr lang="en-US" sz="2800" dirty="0">
+                <a:solidFill>
+                  <a:srgbClr val="000000"/>
+                </a:solidFill>
+                <a:latin typeface="Courier New" panose="02070309020205020404" pitchFamily="49" charset="0"/>
+              </a:rPr>
+              <a:t> </a:t>
+            </a:r>
+          </a:p>
+          <a:p>
+            <a:pPr lvl="1"/>
+            <a:r>
+              <a:rPr lang="en-US" sz="2800" b="1" dirty="0">
+                <a:solidFill>
+                  <a:srgbClr val="000080"/>
+                </a:solidFill>
+                <a:latin typeface="Courier New" panose="02070309020205020404" pitchFamily="49" charset="0"/>
+              </a:rPr>
+              <a:t>}</a:t>
+            </a:r>
+            <a:r>
+              <a:rPr lang="en-US" sz="2800" dirty="0">
+                <a:solidFill>
+                  <a:srgbClr val="000000"/>
+                </a:solidFill>
+                <a:latin typeface="Courier New" panose="02070309020205020404" pitchFamily="49" charset="0"/>
+              </a:rPr>
+              <a:t> </a:t>
+            </a:r>
+          </a:p>
+          <a:p>
+            <a:r>
+              <a:rPr lang="en-US" sz="2800" b="1" dirty="0">
+                <a:solidFill>
+                  <a:srgbClr val="000080"/>
+                </a:solidFill>
+                <a:latin typeface="Courier New" panose="02070309020205020404" pitchFamily="49" charset="0"/>
+              </a:rPr>
+              <a:t>}</a:t>
+            </a:r>
+            <a:endParaRPr lang="en-US" sz="2800" dirty="0">
+              <a:effectLst/>
+            </a:endParaRPr>
+          </a:p>
+        </p:txBody>
+      </p:sp>
     </p:spTree>
   </p:cSld>
   <p:clrMapOvr>

</xml_diff>

<commit_message>
Added photos and video
</commit_message>
<xml_diff>
--- a/Presentation Stuff/CEE-345 Poster Template_36x48.pptx
+++ b/Presentation Stuff/CEE-345 Poster Template_36x48.pptx
@@ -5340,7 +5340,7 @@
         </p:nvSpPr>
         <p:spPr bwMode="auto">
           <a:xfrm>
-            <a:off x="14146921" y="19587324"/>
+            <a:off x="14146921" y="19466392"/>
             <a:ext cx="12448281" cy="1028700"/>
           </a:xfrm>
           <a:prstGeom prst="rect">
@@ -6754,6 +6754,41 @@
           </a:p>
         </p:txBody>
       </p:sp>
+      <p:pic>
+        <p:nvPicPr>
+          <p:cNvPr id="6" name="Picture 5" descr="A close up of a device&#10;&#10;Description automatically generated">
+            <a:extLst>
+              <a:ext uri="{FF2B5EF4-FFF2-40B4-BE49-F238E27FC236}">
+                <a16:creationId xmlns:a16="http://schemas.microsoft.com/office/drawing/2014/main" id="{893962BD-D690-4D82-8C8D-A073D6B5AB28}"/>
+              </a:ext>
+            </a:extLst>
+          </p:cNvPr>
+          <p:cNvPicPr>
+            <a:picLocks noChangeAspect="1"/>
+          </p:cNvPicPr>
+          <p:nvPr/>
+        </p:nvPicPr>
+        <p:blipFill rotWithShape="1">
+          <a:blip r:embed="rId8">
+            <a:extLst>
+              <a:ext uri="{28A0092B-C50C-407E-A947-70E740481C1C}">
+                <a14:useLocalDpi xmlns:a14="http://schemas.microsoft.com/office/drawing/2010/main" val="0"/>
+              </a:ext>
+            </a:extLst>
+          </a:blip>
+          <a:srcRect l="25954" t="3240" r="25088" b="5741"/>
+          <a:stretch/>
+        </p:blipFill>
+        <p:spPr>
+          <a:xfrm>
+            <a:off x="16433405" y="20859171"/>
+            <a:ext cx="7863639" cy="8223360"/>
+          </a:xfrm>
+          <a:prstGeom prst="rect">
+            <a:avLst/>
+          </a:prstGeom>
+        </p:spPr>
+      </p:pic>
     </p:spTree>
   </p:cSld>
   <p:clrMapOvr>

</xml_diff>